<commit_message>
kromě UML a UI všechny ústní
</commit_message>
<xml_diff>
--- a/prezentace/xnovm288-obhajoba.pptx
+++ b/prezentace/xnovm288-obhajoba.pptx
@@ -269,7 +269,7 @@
       </p15:sldGuideLst>
     </p:ext>
     <p:ext uri="http://customooxmlschemas.google.com/">
-      <go:slidesCustomData xmlns:go="http://customooxmlschemas.google.com/" xmlns:ahyp="http://schemas.microsoft.com/office/drawing/2018/hyperlinkcolor" xmlns:p15="http://schemas.microsoft.com/office/powerpoint/2012/main" xmlns:p14="http://schemas.microsoft.com/office/powerpoint/2010/main" xmlns:com="http://schemas.openxmlformats.org/drawingml/2006/compatibility" xmlns:pvml="urn:schemas-microsoft-com:office:powerpoint" xmlns:v="urn:schemas-microsoft-com:vml" xmlns:o="urn:schemas-microsoft-com:office:office" xmlns:dgm="http://schemas.openxmlformats.org/drawingml/2006/diagram" xmlns:c="http://schemas.openxmlformats.org/drawingml/2006/chart" xmlns:mv="urn:schemas-microsoft-com:mac:vml" xmlns:mc="http://schemas.openxmlformats.org/markup-compatibility/2006" xmlns="" r:id="rId16" roundtripDataSignature="AMtx7mg9lZL0Z4XdrdguLmTmZ1IR0YPN+Q=="/>
+      <go:slidesCustomData xmlns="" xmlns:mc="http://schemas.openxmlformats.org/markup-compatibility/2006" xmlns:mv="urn:schemas-microsoft-com:mac:vml" xmlns:c="http://schemas.openxmlformats.org/drawingml/2006/chart" xmlns:dgm="http://schemas.openxmlformats.org/drawingml/2006/diagram" xmlns:o="urn:schemas-microsoft-com:office:office" xmlns:v="urn:schemas-microsoft-com:vml" xmlns:pvml="urn:schemas-microsoft-com:office:powerpoint" xmlns:com="http://schemas.openxmlformats.org/drawingml/2006/compatibility" xmlns:p14="http://schemas.microsoft.com/office/powerpoint/2010/main" xmlns:p15="http://schemas.microsoft.com/office/powerpoint/2012/main" xmlns:ahyp="http://schemas.microsoft.com/office/drawing/2018/hyperlinkcolor" xmlns:go="http://customooxmlschemas.google.com/" r:id="rId16" roundtripDataSignature="AMtx7mg9lZL0Z4XdrdguLmTmZ1IR0YPN+Q=="/>
     </p:ext>
   </p:extLst>
 </p:presentation>
@@ -1908,6 +1908,397 @@
           <a:p>
             <a:r>
               <a:rPr lang="cs-CZ" dirty="0"/>
+              <a:t>Cílem práce je vytvořit univerzální knihovnu nezávislou na použitém UI a vzorovou implementaci, sloužící jako test funkčnosti a příklad jak použít knihovnu</a:t>
+            </a:r>
+          </a:p>
+        </p:txBody>
+      </p:sp>
+      <p:sp>
+        <p:nvSpPr>
+          <p:cNvPr id="4" name="Zástupný symbol pro číslo snímku 3"/>
+          <p:cNvSpPr>
+            <a:spLocks noGrp="1"/>
+          </p:cNvSpPr>
+          <p:nvPr>
+            <p:ph type="sldNum" idx="12"/>
+          </p:nvPr>
+        </p:nvSpPr>
+        <p:spPr/>
+        <p:txBody>
+          <a:bodyPr/>
+          <a:lstStyle/>
+          <a:p>
+            <a:pPr marL="0" marR="0" lvl="0" indent="0" algn="r" rtl="0">
+              <a:lnSpc>
+                <a:spcPct val="100000"/>
+              </a:lnSpc>
+              <a:spcBef>
+                <a:spcPts val="0"/>
+              </a:spcBef>
+              <a:spcAft>
+                <a:spcPts val="0"/>
+              </a:spcAft>
+              <a:buClr>
+                <a:srgbClr val="000000"/>
+              </a:buClr>
+              <a:buSzPts val="1200"/>
+              <a:buFont typeface="Arial"/>
+              <a:buNone/>
+            </a:pPr>
+            <a:fld id="{00000000-1234-1234-1234-123412341234}" type="slidenum">
+              <a:rPr lang="cs-CZ" sz="1200" b="0" i="0" u="none" strike="noStrike" cap="none" smtClean="0">
+                <a:solidFill>
+                  <a:schemeClr val="dk1"/>
+                </a:solidFill>
+                <a:latin typeface="Calibri"/>
+                <a:ea typeface="Calibri"/>
+                <a:cs typeface="Calibri"/>
+                <a:sym typeface="Calibri"/>
+              </a:rPr>
+              <a:t>3</a:t>
+            </a:fld>
+            <a:endParaRPr lang="cs-CZ" sz="1200" b="0" i="0" u="none" strike="noStrike" cap="none">
+              <a:solidFill>
+                <a:schemeClr val="dk1"/>
+              </a:solidFill>
+              <a:latin typeface="Calibri"/>
+              <a:ea typeface="Calibri"/>
+              <a:cs typeface="Calibri"/>
+              <a:sym typeface="Calibri"/>
+            </a:endParaRPr>
+          </a:p>
+        </p:txBody>
+      </p:sp>
+    </p:spTree>
+    <p:extLst>
+      <p:ext uri="{BB962C8B-B14F-4D97-AF65-F5344CB8AC3E}">
+        <p14:creationId xmlns:p14="http://schemas.microsoft.com/office/powerpoint/2010/main" val="2963365863"/>
+      </p:ext>
+    </p:extLst>
+  </p:cSld>
+  <p:clrMapOvr>
+    <a:masterClrMapping/>
+  </p:clrMapOvr>
+</p:notes>
+</file>
+
+<file path=ppt/notesSlides/notesSlide3.xml><?xml version="1.0" encoding="utf-8"?>
+<p:notes xmlns:a="http://schemas.openxmlformats.org/drawingml/2006/main" xmlns:r="http://schemas.openxmlformats.org/officeDocument/2006/relationships" xmlns:p="http://schemas.openxmlformats.org/presentationml/2006/main">
+  <p:cSld>
+    <p:spTree>
+      <p:nvGrpSpPr>
+        <p:cNvPr id="1" name=""/>
+        <p:cNvGrpSpPr/>
+        <p:nvPr/>
+      </p:nvGrpSpPr>
+      <p:grpSpPr>
+        <a:xfrm>
+          <a:off x="0" y="0"/>
+          <a:ext cx="0" cy="0"/>
+          <a:chOff x="0" y="0"/>
+          <a:chExt cx="0" cy="0"/>
+        </a:xfrm>
+      </p:grpSpPr>
+      <p:sp>
+        <p:nvSpPr>
+          <p:cNvPr id="2" name="Zástupný symbol pro obrázek snímku 1"/>
+          <p:cNvSpPr>
+            <a:spLocks noGrp="1" noRot="1" noChangeAspect="1"/>
+          </p:cNvSpPr>
+          <p:nvPr>
+            <p:ph type="sldImg"/>
+          </p:nvPr>
+        </p:nvSpPr>
+        <p:spPr/>
+      </p:sp>
+      <p:sp>
+        <p:nvSpPr>
+          <p:cNvPr id="3" name="Zástupný symbol pro poznámky 2"/>
+          <p:cNvSpPr>
+            <a:spLocks noGrp="1"/>
+          </p:cNvSpPr>
+          <p:nvPr>
+            <p:ph type="body" idx="1"/>
+          </p:nvPr>
+        </p:nvSpPr>
+        <p:spPr/>
+        <p:txBody>
+          <a:bodyPr/>
+          <a:lstStyle/>
+          <a:p>
+            <a:r>
+              <a:rPr lang="cs-CZ" dirty="0"/>
+              <a:t>Nejprve byli porovnány C#, Java a C++, aby bylo možné vybrat, který z nich bude nejvhodnější k vytvoření knihovny.</a:t>
+            </a:r>
+          </a:p>
+          <a:p>
+            <a:r>
+              <a:rPr lang="cs-CZ" dirty="0"/>
+              <a:t>Poté proběhlo srovnání UI pro .NET a herních </a:t>
+            </a:r>
+            <a:r>
+              <a:rPr lang="cs-CZ" dirty="0" err="1"/>
+              <a:t>enginů</a:t>
+            </a:r>
+            <a:endParaRPr lang="cs-CZ" dirty="0"/>
+          </a:p>
+          <a:p>
+            <a:r>
+              <a:rPr lang="cs-CZ" dirty="0"/>
+              <a:t>Nakonec byla vytvořena univerzální knihovna a testovací aplikace</a:t>
+            </a:r>
+          </a:p>
+        </p:txBody>
+      </p:sp>
+      <p:sp>
+        <p:nvSpPr>
+          <p:cNvPr id="4" name="Zástupný symbol pro číslo snímku 3"/>
+          <p:cNvSpPr>
+            <a:spLocks noGrp="1"/>
+          </p:cNvSpPr>
+          <p:nvPr>
+            <p:ph type="sldNum" idx="12"/>
+          </p:nvPr>
+        </p:nvSpPr>
+        <p:spPr/>
+        <p:txBody>
+          <a:bodyPr/>
+          <a:lstStyle/>
+          <a:p>
+            <a:pPr marL="0" marR="0" lvl="0" indent="0" algn="r" rtl="0">
+              <a:lnSpc>
+                <a:spcPct val="100000"/>
+              </a:lnSpc>
+              <a:spcBef>
+                <a:spcPts val="0"/>
+              </a:spcBef>
+              <a:spcAft>
+                <a:spcPts val="0"/>
+              </a:spcAft>
+              <a:buClr>
+                <a:srgbClr val="000000"/>
+              </a:buClr>
+              <a:buSzPts val="1200"/>
+              <a:buFont typeface="Arial"/>
+              <a:buNone/>
+            </a:pPr>
+            <a:fld id="{00000000-1234-1234-1234-123412341234}" type="slidenum">
+              <a:rPr lang="cs-CZ" sz="1200" b="0" i="0" u="none" strike="noStrike" cap="none" smtClean="0">
+                <a:solidFill>
+                  <a:schemeClr val="dk1"/>
+                </a:solidFill>
+                <a:latin typeface="Calibri"/>
+                <a:ea typeface="Calibri"/>
+                <a:cs typeface="Calibri"/>
+                <a:sym typeface="Calibri"/>
+              </a:rPr>
+              <a:t>4</a:t>
+            </a:fld>
+            <a:endParaRPr lang="cs-CZ" sz="1200" b="0" i="0" u="none" strike="noStrike" cap="none">
+              <a:solidFill>
+                <a:schemeClr val="dk1"/>
+              </a:solidFill>
+              <a:latin typeface="Calibri"/>
+              <a:ea typeface="Calibri"/>
+              <a:cs typeface="Calibri"/>
+              <a:sym typeface="Calibri"/>
+            </a:endParaRPr>
+          </a:p>
+        </p:txBody>
+      </p:sp>
+    </p:spTree>
+    <p:extLst>
+      <p:ext uri="{BB962C8B-B14F-4D97-AF65-F5344CB8AC3E}">
+        <p14:creationId xmlns:p14="http://schemas.microsoft.com/office/powerpoint/2010/main" val="1031961404"/>
+      </p:ext>
+    </p:extLst>
+  </p:cSld>
+  <p:clrMapOvr>
+    <a:masterClrMapping/>
+  </p:clrMapOvr>
+</p:notes>
+</file>
+
+<file path=ppt/notesSlides/notesSlide4.xml><?xml version="1.0" encoding="utf-8"?>
+<p:notes xmlns:a="http://schemas.openxmlformats.org/drawingml/2006/main" xmlns:r="http://schemas.openxmlformats.org/officeDocument/2006/relationships" xmlns:p="http://schemas.openxmlformats.org/presentationml/2006/main">
+  <p:cSld>
+    <p:spTree>
+      <p:nvGrpSpPr>
+        <p:cNvPr id="1" name=""/>
+        <p:cNvGrpSpPr/>
+        <p:nvPr/>
+      </p:nvGrpSpPr>
+      <p:grpSpPr>
+        <a:xfrm>
+          <a:off x="0" y="0"/>
+          <a:ext cx="0" cy="0"/>
+          <a:chOff x="0" y="0"/>
+          <a:chExt cx="0" cy="0"/>
+        </a:xfrm>
+      </p:grpSpPr>
+      <p:sp>
+        <p:nvSpPr>
+          <p:cNvPr id="2" name="Zástupný symbol pro obrázek snímku 1"/>
+          <p:cNvSpPr>
+            <a:spLocks noGrp="1" noRot="1" noChangeAspect="1"/>
+          </p:cNvSpPr>
+          <p:nvPr>
+            <p:ph type="sldImg"/>
+          </p:nvPr>
+        </p:nvSpPr>
+        <p:spPr/>
+      </p:sp>
+      <p:sp>
+        <p:nvSpPr>
+          <p:cNvPr id="3" name="Zástupný symbol pro poznámky 2"/>
+          <p:cNvSpPr>
+            <a:spLocks noGrp="1"/>
+          </p:cNvSpPr>
+          <p:nvPr>
+            <p:ph type="body" idx="1"/>
+          </p:nvPr>
+        </p:nvSpPr>
+        <p:spPr/>
+        <p:txBody>
+          <a:bodyPr/>
+          <a:lstStyle/>
+          <a:p>
+            <a:r>
+              <a:rPr lang="cs-CZ" dirty="0"/>
+              <a:t>Jelikož Java není podporována žádným velkým </a:t>
+            </a:r>
+            <a:r>
+              <a:rPr lang="cs-CZ" dirty="0" err="1"/>
+              <a:t>enginem</a:t>
+            </a:r>
+            <a:r>
+              <a:rPr lang="cs-CZ" dirty="0"/>
+              <a:t>, má výrazně menší použitelnost pro hry. C# má oproti C++ výhodu v lepší čitelnosti a možnosti kombinování s ostatními .NET jazyky.</a:t>
+            </a:r>
+          </a:p>
+          <a:p>
+            <a:r>
+              <a:rPr lang="cs-CZ" dirty="0"/>
+              <a:t>Další výhodou je podpora Unity, o kterém budu mluvit za chvíli.</a:t>
+            </a:r>
+          </a:p>
+        </p:txBody>
+      </p:sp>
+      <p:sp>
+        <p:nvSpPr>
+          <p:cNvPr id="4" name="Zástupný symbol pro číslo snímku 3"/>
+          <p:cNvSpPr>
+            <a:spLocks noGrp="1"/>
+          </p:cNvSpPr>
+          <p:nvPr>
+            <p:ph type="sldNum" idx="12"/>
+          </p:nvPr>
+        </p:nvSpPr>
+        <p:spPr/>
+        <p:txBody>
+          <a:bodyPr/>
+          <a:lstStyle/>
+          <a:p>
+            <a:pPr marL="0" marR="0" lvl="0" indent="0" algn="r" rtl="0">
+              <a:lnSpc>
+                <a:spcPct val="100000"/>
+              </a:lnSpc>
+              <a:spcBef>
+                <a:spcPts val="0"/>
+              </a:spcBef>
+              <a:spcAft>
+                <a:spcPts val="0"/>
+              </a:spcAft>
+              <a:buClr>
+                <a:srgbClr val="000000"/>
+              </a:buClr>
+              <a:buSzPts val="1200"/>
+              <a:buFont typeface="Arial"/>
+              <a:buNone/>
+            </a:pPr>
+            <a:fld id="{00000000-1234-1234-1234-123412341234}" type="slidenum">
+              <a:rPr lang="cs-CZ" sz="1200" b="0" i="0" u="none" strike="noStrike" cap="none" smtClean="0">
+                <a:solidFill>
+                  <a:schemeClr val="dk1"/>
+                </a:solidFill>
+                <a:latin typeface="Calibri"/>
+                <a:ea typeface="Calibri"/>
+                <a:cs typeface="Calibri"/>
+                <a:sym typeface="Calibri"/>
+              </a:rPr>
+              <a:t>5</a:t>
+            </a:fld>
+            <a:endParaRPr lang="cs-CZ" sz="1200" b="0" i="0" u="none" strike="noStrike" cap="none">
+              <a:solidFill>
+                <a:schemeClr val="dk1"/>
+              </a:solidFill>
+              <a:latin typeface="Calibri"/>
+              <a:ea typeface="Calibri"/>
+              <a:cs typeface="Calibri"/>
+              <a:sym typeface="Calibri"/>
+            </a:endParaRPr>
+          </a:p>
+        </p:txBody>
+      </p:sp>
+    </p:spTree>
+    <p:extLst>
+      <p:ext uri="{BB962C8B-B14F-4D97-AF65-F5344CB8AC3E}">
+        <p14:creationId xmlns:p14="http://schemas.microsoft.com/office/powerpoint/2010/main" val="3175773354"/>
+      </p:ext>
+    </p:extLst>
+  </p:cSld>
+  <p:clrMapOvr>
+    <a:masterClrMapping/>
+  </p:clrMapOvr>
+</p:notes>
+</file>
+
+<file path=ppt/notesSlides/notesSlide5.xml><?xml version="1.0" encoding="utf-8"?>
+<p:notes xmlns:a="http://schemas.openxmlformats.org/drawingml/2006/main" xmlns:r="http://schemas.openxmlformats.org/officeDocument/2006/relationships" xmlns:p="http://schemas.openxmlformats.org/presentationml/2006/main">
+  <p:cSld>
+    <p:spTree>
+      <p:nvGrpSpPr>
+        <p:cNvPr id="1" name=""/>
+        <p:cNvGrpSpPr/>
+        <p:nvPr/>
+      </p:nvGrpSpPr>
+      <p:grpSpPr>
+        <a:xfrm>
+          <a:off x="0" y="0"/>
+          <a:ext cx="0" cy="0"/>
+          <a:chOff x="0" y="0"/>
+          <a:chExt cx="0" cy="0"/>
+        </a:xfrm>
+      </p:grpSpPr>
+      <p:sp>
+        <p:nvSpPr>
+          <p:cNvPr id="2" name="Zástupný symbol pro obrázek snímku 1"/>
+          <p:cNvSpPr>
+            <a:spLocks noGrp="1" noRot="1" noChangeAspect="1"/>
+          </p:cNvSpPr>
+          <p:nvPr>
+            <p:ph type="sldImg"/>
+          </p:nvPr>
+        </p:nvSpPr>
+        <p:spPr/>
+      </p:sp>
+      <p:sp>
+        <p:nvSpPr>
+          <p:cNvPr id="3" name="Zástupný symbol pro poznámky 2"/>
+          <p:cNvSpPr>
+            <a:spLocks noGrp="1"/>
+          </p:cNvSpPr>
+          <p:nvPr>
+            <p:ph type="body" idx="1"/>
+          </p:nvPr>
+        </p:nvSpPr>
+        <p:spPr/>
+        <p:txBody>
+          <a:bodyPr/>
+          <a:lstStyle/>
+          <a:p>
+            <a:r>
+              <a:rPr lang="cs-CZ" dirty="0"/>
               <a:t>Zde je porovnání 3 nejpopulárnějších veřejně dostupných herních </a:t>
             </a:r>
             <a:r>
@@ -1924,15 +2315,7 @@
             </a:r>
             <a:r>
               <a:rPr lang="cs-CZ" dirty="0"/>
-              <a:t> či CRYENGINE se cena nezmění, ale pro Unity se zvýší na 100k. Z toho vyplývá, že Unity je vhodné především pro malá studia </a:t>
-            </a:r>
-            <a:r>
-              <a:rPr lang="cs-CZ" dirty="0" err="1"/>
-              <a:t>studia</a:t>
-            </a:r>
-            <a:r>
-              <a:rPr lang="cs-CZ" dirty="0"/>
-              <a:t> s pár vývojáři, ale pro větší studia je výhodnější </a:t>
+              <a:t> či CRYENGINE se cena nezmění, ale pro Unity se zvýší na 100k. Z toho vyplývá, že Unity je vhodné především pro malá studia s pár vývojáři, ale pro větší studia je výhodnější </a:t>
             </a:r>
             <a:r>
               <a:rPr lang="cs-CZ" dirty="0" err="1"/>
@@ -2005,6 +2388,565 @@
     <p:extLst>
       <p:ext uri="{BB962C8B-B14F-4D97-AF65-F5344CB8AC3E}">
         <p14:creationId xmlns:p14="http://schemas.microsoft.com/office/powerpoint/2010/main" val="482863660"/>
+      </p:ext>
+    </p:extLst>
+  </p:cSld>
+  <p:clrMapOvr>
+    <a:masterClrMapping/>
+  </p:clrMapOvr>
+</p:notes>
+</file>
+
+<file path=ppt/notesSlides/notesSlide6.xml><?xml version="1.0" encoding="utf-8"?>
+<p:notes xmlns:a="http://schemas.openxmlformats.org/drawingml/2006/main" xmlns:r="http://schemas.openxmlformats.org/officeDocument/2006/relationships" xmlns:p="http://schemas.openxmlformats.org/presentationml/2006/main">
+  <p:cSld>
+    <p:spTree>
+      <p:nvGrpSpPr>
+        <p:cNvPr id="1" name=""/>
+        <p:cNvGrpSpPr/>
+        <p:nvPr/>
+      </p:nvGrpSpPr>
+      <p:grpSpPr>
+        <a:xfrm>
+          <a:off x="0" y="0"/>
+          <a:ext cx="0" cy="0"/>
+          <a:chOff x="0" y="0"/>
+          <a:chExt cx="0" cy="0"/>
+        </a:xfrm>
+      </p:grpSpPr>
+      <p:sp>
+        <p:nvSpPr>
+          <p:cNvPr id="2" name="Zástupný symbol pro obrázek snímku 1"/>
+          <p:cNvSpPr>
+            <a:spLocks noGrp="1" noRot="1" noChangeAspect="1"/>
+          </p:cNvSpPr>
+          <p:nvPr>
+            <p:ph type="sldImg"/>
+          </p:nvPr>
+        </p:nvSpPr>
+        <p:spPr/>
+      </p:sp>
+      <p:sp>
+        <p:nvSpPr>
+          <p:cNvPr id="3" name="Zástupný symbol pro poznámky 2"/>
+          <p:cNvSpPr>
+            <a:spLocks noGrp="1"/>
+          </p:cNvSpPr>
+          <p:nvPr>
+            <p:ph type="body" idx="1"/>
+          </p:nvPr>
+        </p:nvSpPr>
+        <p:spPr/>
+        <p:txBody>
+          <a:bodyPr/>
+          <a:lstStyle/>
+          <a:p>
+            <a:r>
+              <a:rPr lang="cs-CZ" dirty="0"/>
+              <a:t>Zde je ukázáno do jaké míry je možné použít knihovnu v různých žánrech. </a:t>
+            </a:r>
+          </a:p>
+          <a:p>
+            <a:r>
+              <a:rPr lang="cs-CZ" dirty="0"/>
+              <a:t>Jelikož je určena pro RPG je zde od programátora nutnost doplnit jen mechaniky specifické pro jeho hru.</a:t>
+            </a:r>
+          </a:p>
+          <a:p>
+            <a:r>
+              <a:rPr lang="cs-CZ" dirty="0"/>
+              <a:t>Většina RPG je současně střílečkou či bojovou hru, takže zde by se měla většina logiky překrývat.</a:t>
+            </a:r>
+          </a:p>
+          <a:p>
+            <a:r>
+              <a:rPr lang="cs-CZ" dirty="0" err="1"/>
+              <a:t>Plošinovky</a:t>
+            </a:r>
+            <a:r>
+              <a:rPr lang="cs-CZ" dirty="0"/>
+              <a:t> až na pár výjimek nemají s RPG společné prvky, takže je její použitelnost nepravděpodobné.</a:t>
+            </a:r>
+          </a:p>
+          <a:p>
+            <a:r>
+              <a:rPr lang="cs-CZ" dirty="0"/>
+              <a:t>U strategií se shoduje souboj jednotek, takže některé třídy se použít dají.</a:t>
+            </a:r>
+          </a:p>
+          <a:p>
+            <a:r>
+              <a:rPr lang="cs-CZ" dirty="0"/>
+              <a:t>Závodní hry sice mohou použít třídy pro předměty a postavy, ale obsahují mnoho vlastností navíc, kterou budou zbytečně zabírat paměť.</a:t>
+            </a:r>
+          </a:p>
+        </p:txBody>
+      </p:sp>
+      <p:sp>
+        <p:nvSpPr>
+          <p:cNvPr id="4" name="Zástupný symbol pro číslo snímku 3"/>
+          <p:cNvSpPr>
+            <a:spLocks noGrp="1"/>
+          </p:cNvSpPr>
+          <p:nvPr>
+            <p:ph type="sldNum" idx="12"/>
+          </p:nvPr>
+        </p:nvSpPr>
+        <p:spPr/>
+        <p:txBody>
+          <a:bodyPr/>
+          <a:lstStyle/>
+          <a:p>
+            <a:pPr marL="0" marR="0" lvl="0" indent="0" algn="r" rtl="0">
+              <a:lnSpc>
+                <a:spcPct val="100000"/>
+              </a:lnSpc>
+              <a:spcBef>
+                <a:spcPts val="0"/>
+              </a:spcBef>
+              <a:spcAft>
+                <a:spcPts val="0"/>
+              </a:spcAft>
+              <a:buClr>
+                <a:srgbClr val="000000"/>
+              </a:buClr>
+              <a:buSzPts val="1200"/>
+              <a:buFont typeface="Arial"/>
+              <a:buNone/>
+            </a:pPr>
+            <a:fld id="{00000000-1234-1234-1234-123412341234}" type="slidenum">
+              <a:rPr lang="cs-CZ" sz="1200" b="0" i="0" u="none" strike="noStrike" cap="none" smtClean="0">
+                <a:solidFill>
+                  <a:schemeClr val="dk1"/>
+                </a:solidFill>
+                <a:latin typeface="Calibri"/>
+                <a:ea typeface="Calibri"/>
+                <a:cs typeface="Calibri"/>
+                <a:sym typeface="Calibri"/>
+              </a:rPr>
+              <a:t>9</a:t>
+            </a:fld>
+            <a:endParaRPr lang="cs-CZ" sz="1200" b="0" i="0" u="none" strike="noStrike" cap="none">
+              <a:solidFill>
+                <a:schemeClr val="dk1"/>
+              </a:solidFill>
+              <a:latin typeface="Calibri"/>
+              <a:ea typeface="Calibri"/>
+              <a:cs typeface="Calibri"/>
+              <a:sym typeface="Calibri"/>
+            </a:endParaRPr>
+          </a:p>
+        </p:txBody>
+      </p:sp>
+    </p:spTree>
+    <p:extLst>
+      <p:ext uri="{BB962C8B-B14F-4D97-AF65-F5344CB8AC3E}">
+        <p14:creationId xmlns:p14="http://schemas.microsoft.com/office/powerpoint/2010/main" val="1143131876"/>
+      </p:ext>
+    </p:extLst>
+  </p:cSld>
+  <p:clrMapOvr>
+    <a:masterClrMapping/>
+  </p:clrMapOvr>
+</p:notes>
+</file>
+
+<file path=ppt/notesSlides/notesSlide7.xml><?xml version="1.0" encoding="utf-8"?>
+<p:notes xmlns:a="http://schemas.openxmlformats.org/drawingml/2006/main" xmlns:r="http://schemas.openxmlformats.org/officeDocument/2006/relationships" xmlns:p="http://schemas.openxmlformats.org/presentationml/2006/main">
+  <p:cSld>
+    <p:spTree>
+      <p:nvGrpSpPr>
+        <p:cNvPr id="1" name=""/>
+        <p:cNvGrpSpPr/>
+        <p:nvPr/>
+      </p:nvGrpSpPr>
+      <p:grpSpPr>
+        <a:xfrm>
+          <a:off x="0" y="0"/>
+          <a:ext cx="0" cy="0"/>
+          <a:chOff x="0" y="0"/>
+          <a:chExt cx="0" cy="0"/>
+        </a:xfrm>
+      </p:grpSpPr>
+      <p:sp>
+        <p:nvSpPr>
+          <p:cNvPr id="2" name="Zástupný symbol pro obrázek snímku 1"/>
+          <p:cNvSpPr>
+            <a:spLocks noGrp="1" noRot="1" noChangeAspect="1"/>
+          </p:cNvSpPr>
+          <p:nvPr>
+            <p:ph type="sldImg"/>
+          </p:nvPr>
+        </p:nvSpPr>
+        <p:spPr/>
+      </p:sp>
+      <p:sp>
+        <p:nvSpPr>
+          <p:cNvPr id="3" name="Zástupný symbol pro poznámky 2"/>
+          <p:cNvSpPr>
+            <a:spLocks noGrp="1"/>
+          </p:cNvSpPr>
+          <p:nvPr>
+            <p:ph type="body" idx="1"/>
+          </p:nvPr>
+        </p:nvSpPr>
+        <p:spPr/>
+        <p:txBody>
+          <a:bodyPr/>
+          <a:lstStyle/>
+          <a:p>
+            <a:r>
+              <a:rPr lang="cs-CZ" dirty="0"/>
+              <a:t>K realizaci byl zvolen C#, který stejně jako C++ podporuje 2/3 </a:t>
+            </a:r>
+            <a:r>
+              <a:rPr lang="cs-CZ" dirty="0" err="1"/>
+              <a:t>enginů</a:t>
+            </a:r>
+            <a:r>
+              <a:rPr lang="cs-CZ" dirty="0"/>
+              <a:t>, avšak navíc je jeho kód čitelnější a je možné ho kombinovat s více jazyky, což zvyšuje jeho univerzálnost.</a:t>
+            </a:r>
+          </a:p>
+        </p:txBody>
+      </p:sp>
+      <p:sp>
+        <p:nvSpPr>
+          <p:cNvPr id="4" name="Zástupný symbol pro číslo snímku 3"/>
+          <p:cNvSpPr>
+            <a:spLocks noGrp="1"/>
+          </p:cNvSpPr>
+          <p:nvPr>
+            <p:ph type="sldNum" idx="12"/>
+          </p:nvPr>
+        </p:nvSpPr>
+        <p:spPr/>
+        <p:txBody>
+          <a:bodyPr/>
+          <a:lstStyle/>
+          <a:p>
+            <a:pPr marL="0" marR="0" lvl="0" indent="0" algn="r" rtl="0">
+              <a:lnSpc>
+                <a:spcPct val="100000"/>
+              </a:lnSpc>
+              <a:spcBef>
+                <a:spcPts val="0"/>
+              </a:spcBef>
+              <a:spcAft>
+                <a:spcPts val="0"/>
+              </a:spcAft>
+              <a:buClr>
+                <a:srgbClr val="000000"/>
+              </a:buClr>
+              <a:buSzPts val="1200"/>
+              <a:buFont typeface="Arial"/>
+              <a:buNone/>
+            </a:pPr>
+            <a:fld id="{00000000-1234-1234-1234-123412341234}" type="slidenum">
+              <a:rPr lang="cs-CZ" sz="1200" b="0" i="0" u="none" strike="noStrike" cap="none" smtClean="0">
+                <a:solidFill>
+                  <a:schemeClr val="dk1"/>
+                </a:solidFill>
+                <a:latin typeface="Calibri"/>
+                <a:ea typeface="Calibri"/>
+                <a:cs typeface="Calibri"/>
+                <a:sym typeface="Calibri"/>
+              </a:rPr>
+              <a:t>10</a:t>
+            </a:fld>
+            <a:endParaRPr lang="cs-CZ" sz="1200" b="0" i="0" u="none" strike="noStrike" cap="none">
+              <a:solidFill>
+                <a:schemeClr val="dk1"/>
+              </a:solidFill>
+              <a:latin typeface="Calibri"/>
+              <a:ea typeface="Calibri"/>
+              <a:cs typeface="Calibri"/>
+              <a:sym typeface="Calibri"/>
+            </a:endParaRPr>
+          </a:p>
+        </p:txBody>
+      </p:sp>
+    </p:spTree>
+    <p:extLst>
+      <p:ext uri="{BB962C8B-B14F-4D97-AF65-F5344CB8AC3E}">
+        <p14:creationId xmlns:p14="http://schemas.microsoft.com/office/powerpoint/2010/main" val="2011417346"/>
+      </p:ext>
+    </p:extLst>
+  </p:cSld>
+  <p:clrMapOvr>
+    <a:masterClrMapping/>
+  </p:clrMapOvr>
+</p:notes>
+</file>
+
+<file path=ppt/notesSlides/notesSlide8.xml><?xml version="1.0" encoding="utf-8"?>
+<p:notes xmlns:a="http://schemas.openxmlformats.org/drawingml/2006/main" xmlns:r="http://schemas.openxmlformats.org/officeDocument/2006/relationships" xmlns:p="http://schemas.openxmlformats.org/presentationml/2006/main">
+  <p:cSld>
+    <p:spTree>
+      <p:nvGrpSpPr>
+        <p:cNvPr id="1" name=""/>
+        <p:cNvGrpSpPr/>
+        <p:nvPr/>
+      </p:nvGrpSpPr>
+      <p:grpSpPr>
+        <a:xfrm>
+          <a:off x="0" y="0"/>
+          <a:ext cx="0" cy="0"/>
+          <a:chOff x="0" y="0"/>
+          <a:chExt cx="0" cy="0"/>
+        </a:xfrm>
+      </p:grpSpPr>
+      <p:sp>
+        <p:nvSpPr>
+          <p:cNvPr id="2" name="Zástupný symbol pro obrázek snímku 1"/>
+          <p:cNvSpPr>
+            <a:spLocks noGrp="1" noRot="1" noChangeAspect="1"/>
+          </p:cNvSpPr>
+          <p:nvPr>
+            <p:ph type="sldImg"/>
+          </p:nvPr>
+        </p:nvSpPr>
+        <p:spPr/>
+      </p:sp>
+      <p:sp>
+        <p:nvSpPr>
+          <p:cNvPr id="3" name="Zástupný symbol pro poznámky 2"/>
+          <p:cNvSpPr>
+            <a:spLocks noGrp="1"/>
+          </p:cNvSpPr>
+          <p:nvPr>
+            <p:ph type="body" idx="1"/>
+          </p:nvPr>
+        </p:nvSpPr>
+        <p:spPr/>
+        <p:txBody>
+          <a:bodyPr/>
+          <a:lstStyle/>
+          <a:p>
+            <a:endParaRPr lang="cs-CZ" dirty="0"/>
+          </a:p>
+        </p:txBody>
+      </p:sp>
+      <p:sp>
+        <p:nvSpPr>
+          <p:cNvPr id="4" name="Zástupný symbol pro číslo snímku 3"/>
+          <p:cNvSpPr>
+            <a:spLocks noGrp="1"/>
+          </p:cNvSpPr>
+          <p:nvPr>
+            <p:ph type="sldNum" idx="12"/>
+          </p:nvPr>
+        </p:nvSpPr>
+        <p:spPr/>
+        <p:txBody>
+          <a:bodyPr/>
+          <a:lstStyle/>
+          <a:p>
+            <a:pPr marL="0" marR="0" lvl="0" indent="0" algn="r" rtl="0">
+              <a:lnSpc>
+                <a:spcPct val="100000"/>
+              </a:lnSpc>
+              <a:spcBef>
+                <a:spcPts val="0"/>
+              </a:spcBef>
+              <a:spcAft>
+                <a:spcPts val="0"/>
+              </a:spcAft>
+              <a:buClr>
+                <a:srgbClr val="000000"/>
+              </a:buClr>
+              <a:buSzPts val="1200"/>
+              <a:buFont typeface="Arial"/>
+              <a:buNone/>
+            </a:pPr>
+            <a:fld id="{00000000-1234-1234-1234-123412341234}" type="slidenum">
+              <a:rPr lang="cs-CZ" sz="1200" b="0" i="0" u="none" strike="noStrike" cap="none" smtClean="0">
+                <a:solidFill>
+                  <a:schemeClr val="dk1"/>
+                </a:solidFill>
+                <a:latin typeface="Calibri"/>
+                <a:ea typeface="Calibri"/>
+                <a:cs typeface="Calibri"/>
+                <a:sym typeface="Calibri"/>
+              </a:rPr>
+              <a:t>12</a:t>
+            </a:fld>
+            <a:endParaRPr lang="cs-CZ" sz="1200" b="0" i="0" u="none" strike="noStrike" cap="none">
+              <a:solidFill>
+                <a:schemeClr val="dk1"/>
+              </a:solidFill>
+              <a:latin typeface="Calibri"/>
+              <a:ea typeface="Calibri"/>
+              <a:cs typeface="Calibri"/>
+              <a:sym typeface="Calibri"/>
+            </a:endParaRPr>
+          </a:p>
+        </p:txBody>
+      </p:sp>
+    </p:spTree>
+    <p:extLst>
+      <p:ext uri="{BB962C8B-B14F-4D97-AF65-F5344CB8AC3E}">
+        <p14:creationId xmlns:p14="http://schemas.microsoft.com/office/powerpoint/2010/main" val="628386665"/>
+      </p:ext>
+    </p:extLst>
+  </p:cSld>
+  <p:clrMapOvr>
+    <a:masterClrMapping/>
+  </p:clrMapOvr>
+</p:notes>
+</file>
+
+<file path=ppt/notesSlides/notesSlide9.xml><?xml version="1.0" encoding="utf-8"?>
+<p:notes xmlns:a="http://schemas.openxmlformats.org/drawingml/2006/main" xmlns:r="http://schemas.openxmlformats.org/officeDocument/2006/relationships" xmlns:p="http://schemas.openxmlformats.org/presentationml/2006/main">
+  <p:cSld>
+    <p:spTree>
+      <p:nvGrpSpPr>
+        <p:cNvPr id="1" name=""/>
+        <p:cNvGrpSpPr/>
+        <p:nvPr/>
+      </p:nvGrpSpPr>
+      <p:grpSpPr>
+        <a:xfrm>
+          <a:off x="0" y="0"/>
+          <a:ext cx="0" cy="0"/>
+          <a:chOff x="0" y="0"/>
+          <a:chExt cx="0" cy="0"/>
+        </a:xfrm>
+      </p:grpSpPr>
+      <p:sp>
+        <p:nvSpPr>
+          <p:cNvPr id="2" name="Zástupný symbol pro obrázek snímku 1"/>
+          <p:cNvSpPr>
+            <a:spLocks noGrp="1" noRot="1" noChangeAspect="1"/>
+          </p:cNvSpPr>
+          <p:nvPr>
+            <p:ph type="sldImg"/>
+          </p:nvPr>
+        </p:nvSpPr>
+        <p:spPr/>
+      </p:sp>
+      <p:sp>
+        <p:nvSpPr>
+          <p:cNvPr id="3" name="Zástupný symbol pro poznámky 2"/>
+          <p:cNvSpPr>
+            <a:spLocks noGrp="1"/>
+          </p:cNvSpPr>
+          <p:nvPr>
+            <p:ph type="body" idx="1"/>
+          </p:nvPr>
+        </p:nvSpPr>
+        <p:spPr/>
+        <p:txBody>
+          <a:bodyPr/>
+          <a:lstStyle/>
+          <a:p>
+            <a:r>
+              <a:rPr lang="cs-CZ" dirty="0"/>
+              <a:t>Unit testy vyhodnocují, zda se výstup metody pro zadané vstupy shoduje s očekávaným výstupem</a:t>
+            </a:r>
+          </a:p>
+          <a:p>
+            <a:endParaRPr lang="cs-CZ" dirty="0"/>
+          </a:p>
+          <a:p>
+            <a:r>
+              <a:rPr lang="cs-CZ" dirty="0"/>
+              <a:t>Alfa testy provádí zaměstnanci firmy, či najaté společnosti, kteří prochází  úrovně hry stále dokola a snaží se provést akci, při které se hra zachová jinak než by měla. Jakmile se jim to podaří musí přijít na to, co konkrétně to způsobilo a zdokumentovat to. Toto je poté odesláno vývojářskému týmu.</a:t>
+            </a:r>
+          </a:p>
+          <a:p>
+            <a:endParaRPr lang="cs-CZ" dirty="0"/>
+          </a:p>
+          <a:p>
+            <a:r>
+              <a:rPr lang="cs-CZ" dirty="0"/>
+              <a:t>Beta testy provádí malý okruh hráčů, kteří mají předběžný přístup ke hře a hlásí případné nalezené problémy. Výhodou oproti alfě je, že se hra dostane na rozmanitější kombinace hardwaru a odhalí se tak případná </a:t>
+            </a:r>
+            <a:r>
+              <a:rPr lang="cs-CZ" dirty="0" err="1"/>
+              <a:t>nekompabilita</a:t>
+            </a:r>
+            <a:endParaRPr lang="cs-CZ" dirty="0"/>
+          </a:p>
+          <a:p>
+            <a:endParaRPr lang="cs-CZ" dirty="0"/>
+          </a:p>
+          <a:p>
+            <a:r>
+              <a:rPr lang="cs-CZ" dirty="0"/>
+              <a:t>Při zátěžových testech se testuje zátěž RAM, </a:t>
+            </a:r>
+            <a:r>
+              <a:rPr lang="cs-CZ" dirty="0" err="1"/>
+              <a:t>vRAM</a:t>
+            </a:r>
+            <a:r>
+              <a:rPr lang="cs-CZ" dirty="0"/>
+              <a:t>, CPU, … a hledá se nejhorší konfigurace, na jaké je možné hru spustit</a:t>
+            </a:r>
+          </a:p>
+        </p:txBody>
+      </p:sp>
+      <p:sp>
+        <p:nvSpPr>
+          <p:cNvPr id="4" name="Zástupný symbol pro číslo snímku 3"/>
+          <p:cNvSpPr>
+            <a:spLocks noGrp="1"/>
+          </p:cNvSpPr>
+          <p:nvPr>
+            <p:ph type="sldNum" idx="12"/>
+          </p:nvPr>
+        </p:nvSpPr>
+        <p:spPr/>
+        <p:txBody>
+          <a:bodyPr/>
+          <a:lstStyle/>
+          <a:p>
+            <a:pPr marL="0" marR="0" lvl="0" indent="0" algn="r" rtl="0">
+              <a:lnSpc>
+                <a:spcPct val="100000"/>
+              </a:lnSpc>
+              <a:spcBef>
+                <a:spcPts val="0"/>
+              </a:spcBef>
+              <a:spcAft>
+                <a:spcPts val="0"/>
+              </a:spcAft>
+              <a:buClr>
+                <a:srgbClr val="000000"/>
+              </a:buClr>
+              <a:buSzPts val="1200"/>
+              <a:buFont typeface="Arial"/>
+              <a:buNone/>
+            </a:pPr>
+            <a:fld id="{00000000-1234-1234-1234-123412341234}" type="slidenum">
+              <a:rPr lang="cs-CZ" sz="1200" b="0" i="0" u="none" strike="noStrike" cap="none" smtClean="0">
+                <a:solidFill>
+                  <a:schemeClr val="dk1"/>
+                </a:solidFill>
+                <a:latin typeface="Calibri"/>
+                <a:ea typeface="Calibri"/>
+                <a:cs typeface="Calibri"/>
+                <a:sym typeface="Calibri"/>
+              </a:rPr>
+              <a:t>13</a:t>
+            </a:fld>
+            <a:endParaRPr lang="cs-CZ" sz="1200" b="0" i="0" u="none" strike="noStrike" cap="none">
+              <a:solidFill>
+                <a:schemeClr val="dk1"/>
+              </a:solidFill>
+              <a:latin typeface="Calibri"/>
+              <a:ea typeface="Calibri"/>
+              <a:cs typeface="Calibri"/>
+              <a:sym typeface="Calibri"/>
+            </a:endParaRPr>
+          </a:p>
+        </p:txBody>
+      </p:sp>
+    </p:spTree>
+    <p:extLst>
+      <p:ext uri="{BB962C8B-B14F-4D97-AF65-F5344CB8AC3E}">
+        <p14:creationId xmlns:p14="http://schemas.microsoft.com/office/powerpoint/2010/main" val="510170956"/>
       </p:ext>
     </p:extLst>
   </p:cSld>
@@ -17621,7 +18563,7 @@
           <p:nvPr>
             <p:extLst>
               <p:ext uri="{D42A27DB-BD31-4B8C-83A1-F6EECF244321}">
-                <p14:modId xmlns:p14="http://schemas.microsoft.com/office/powerpoint/2010/main" val="3977257634"/>
+                <p14:modId xmlns:p14="http://schemas.microsoft.com/office/powerpoint/2010/main" val="961001217"/>
               </p:ext>
             </p:extLst>
           </p:nvPr>
@@ -18002,7 +18944,7 @@
                     <a:p>
                       <a:r>
                         <a:rPr lang="cs-CZ" dirty="0"/>
-                        <a:t>Aplikace pro Windows10/11 a Xbox</a:t>
+                        <a:t>Aplikace pro Windows10/11 a Xbox (UWP)</a:t>
                       </a:r>
                     </a:p>
                     <a:p>

</xml_diff>

<commit_message>
odebrání UI (uspora casu)
</commit_message>
<xml_diff>
--- a/prezentace/xnovm288-obhajoba.pptx
+++ b/prezentace/xnovm288-obhajoba.pptx
@@ -5,7 +5,7 @@
     <p:sldMasterId id="2147483648" r:id="rId1"/>
   </p:sldMasterIdLst>
   <p:notesMasterIdLst>
-    <p:notesMasterId r:id="rId15"/>
+    <p:notesMasterId r:id="rId14"/>
   </p:notesMasterIdLst>
   <p:sldIdLst>
     <p:sldId id="273" r:id="rId2"/>
@@ -13,14 +13,13 @@
     <p:sldId id="262" r:id="rId4"/>
     <p:sldId id="263" r:id="rId5"/>
     <p:sldId id="264" r:id="rId6"/>
-    <p:sldId id="266" r:id="rId7"/>
-    <p:sldId id="265" r:id="rId8"/>
-    <p:sldId id="267" r:id="rId9"/>
-    <p:sldId id="268" r:id="rId10"/>
-    <p:sldId id="269" r:id="rId11"/>
-    <p:sldId id="274" r:id="rId12"/>
-    <p:sldId id="270" r:id="rId13"/>
-    <p:sldId id="271" r:id="rId14"/>
+    <p:sldId id="265" r:id="rId7"/>
+    <p:sldId id="267" r:id="rId8"/>
+    <p:sldId id="268" r:id="rId9"/>
+    <p:sldId id="269" r:id="rId10"/>
+    <p:sldId id="274" r:id="rId11"/>
+    <p:sldId id="270" r:id="rId12"/>
+    <p:sldId id="271" r:id="rId13"/>
   </p:sldIdLst>
   <p:sldSz cx="12192000" cy="7199313"/>
   <p:notesSz cx="6858000" cy="9144000"/>
@@ -269,7 +268,7 @@
       </p15:sldGuideLst>
     </p:ext>
     <p:ext uri="http://customooxmlschemas.google.com/">
-      <go:slidesCustomData xmlns:go="http://customooxmlschemas.google.com/" xmlns:ahyp="http://schemas.microsoft.com/office/drawing/2018/hyperlinkcolor" xmlns:p15="http://schemas.microsoft.com/office/powerpoint/2012/main" xmlns:p14="http://schemas.microsoft.com/office/powerpoint/2010/main" xmlns:com="http://schemas.openxmlformats.org/drawingml/2006/compatibility" xmlns:pvml="urn:schemas-microsoft-com:office:powerpoint" xmlns:v="urn:schemas-microsoft-com:vml" xmlns:o="urn:schemas-microsoft-com:office:office" xmlns:dgm="http://schemas.openxmlformats.org/drawingml/2006/diagram" xmlns:c="http://schemas.openxmlformats.org/drawingml/2006/chart" xmlns:mv="urn:schemas-microsoft-com:mac:vml" xmlns:mc="http://schemas.openxmlformats.org/markup-compatibility/2006" xmlns="" r:id="rId16" roundtripDataSignature="AMtx7mg9lZL0Z4XdrdguLmTmZ1IR0YPN+Q=="/>
+      <go:slidesCustomData xmlns="" xmlns:mc="http://schemas.openxmlformats.org/markup-compatibility/2006" xmlns:mv="urn:schemas-microsoft-com:mac:vml" xmlns:c="http://schemas.openxmlformats.org/drawingml/2006/chart" xmlns:dgm="http://schemas.openxmlformats.org/drawingml/2006/diagram" xmlns:o="urn:schemas-microsoft-com:office:office" xmlns:v="urn:schemas-microsoft-com:vml" xmlns:pvml="urn:schemas-microsoft-com:office:powerpoint" xmlns:com="http://schemas.openxmlformats.org/drawingml/2006/compatibility" xmlns:p14="http://schemas.microsoft.com/office/powerpoint/2010/main" xmlns:p15="http://schemas.microsoft.com/office/powerpoint/2012/main" xmlns:ahyp="http://schemas.microsoft.com/office/drawing/2018/hyperlinkcolor" xmlns:go="http://customooxmlschemas.google.com/" r:id="rId16" roundtripDataSignature="AMtx7mg9lZL0Z4XdrdguLmTmZ1IR0YPN+Q=="/>
     </p:ext>
   </p:extLst>
 </p:presentation>
@@ -1995,7 +1994,7 @@
                 <a:cs typeface="Calibri"/>
                 <a:sym typeface="Calibri"/>
               </a:rPr>
-              <a:t>13</a:t>
+              <a:t>12</a:t>
             </a:fld>
             <a:endParaRPr lang="cs-CZ" sz="1200" b="0" i="0" u="none" strike="noStrike" cap="none">
               <a:solidFill>
@@ -2530,7 +2529,7 @@
                 <a:cs typeface="Calibri"/>
                 <a:sym typeface="Calibri"/>
               </a:rPr>
-              <a:t>7</a:t>
+              <a:t>6</a:t>
             </a:fld>
             <a:endParaRPr lang="cs-CZ" sz="1200" b="0" i="0" u="none" strike="noStrike" cap="none">
               <a:solidFill>
@@ -2672,7 +2671,7 @@
                 <a:cs typeface="Calibri"/>
                 <a:sym typeface="Calibri"/>
               </a:rPr>
-              <a:t>8</a:t>
+              <a:t>7</a:t>
             </a:fld>
             <a:endParaRPr lang="cs-CZ" sz="1200" b="0" i="0" u="none" strike="noStrike" cap="none">
               <a:solidFill>
@@ -2826,7 +2825,7 @@
                 <a:cs typeface="Calibri"/>
                 <a:sym typeface="Calibri"/>
               </a:rPr>
-              <a:t>9</a:t>
+              <a:t>8</a:t>
             </a:fld>
             <a:endParaRPr lang="cs-CZ" sz="1200" b="0" i="0" u="none" strike="noStrike" cap="none">
               <a:solidFill>
@@ -2974,7 +2973,7 @@
                 <a:cs typeface="Calibri"/>
                 <a:sym typeface="Calibri"/>
               </a:rPr>
-              <a:t>10</a:t>
+              <a:t>9</a:t>
             </a:fld>
             <a:endParaRPr lang="cs-CZ" sz="1200" b="0" i="0" u="none" strike="noStrike" cap="none">
               <a:solidFill>
@@ -3091,7 +3090,7 @@
                 <a:cs typeface="Calibri"/>
                 <a:sym typeface="Calibri"/>
               </a:rPr>
-              <a:t>12</a:t>
+              <a:t>11</a:t>
             </a:fld>
             <a:endParaRPr lang="cs-CZ" sz="1200" b="0" i="0" u="none" strike="noStrike" cap="none">
               <a:solidFill>
@@ -15832,72 +15831,6 @@
           <a:bodyPr/>
           <a:lstStyle/>
           <a:p>
-            <a:r>
-              <a:rPr lang="cs-CZ" dirty="0"/>
-              <a:t>Závěr</a:t>
-            </a:r>
-          </a:p>
-        </p:txBody>
-      </p:sp>
-      <p:sp>
-        <p:nvSpPr>
-          <p:cNvPr id="3" name="Zástupný text 2">
-            <a:extLst>
-              <a:ext uri="{FF2B5EF4-FFF2-40B4-BE49-F238E27FC236}">
-                <a16:creationId xmlns:a16="http://schemas.microsoft.com/office/drawing/2014/main" id="{7F11784E-AC65-AAC7-3A0A-A60E6EF0863A}"/>
-              </a:ext>
-            </a:extLst>
-          </p:cNvPr>
-          <p:cNvSpPr>
-            <a:spLocks noGrp="1"/>
-          </p:cNvSpPr>
-          <p:nvPr>
-            <p:ph type="body" idx="1"/>
-          </p:nvPr>
-        </p:nvSpPr>
-        <p:spPr/>
-        <p:txBody>
-          <a:bodyPr/>
-          <a:lstStyle/>
-          <a:p>
-            <a:r>
-              <a:rPr lang="cs-CZ" dirty="0"/>
-              <a:t>K realizaci byl zvolen C# protože podporuje dva ze tří největších herních </a:t>
-            </a:r>
-            <a:r>
-              <a:rPr lang="cs-CZ" dirty="0" err="1"/>
-              <a:t>enginů</a:t>
-            </a:r>
-            <a:endParaRPr lang="cs-CZ" dirty="0"/>
-          </a:p>
-          <a:p>
-            <a:r>
-              <a:rPr lang="cs-CZ" dirty="0"/>
-              <a:t>Výhodou C# oproti C++ je lepší čitelnost a kompatibilita s .NET</a:t>
-            </a:r>
-          </a:p>
-          <a:p>
-            <a:r>
-              <a:rPr lang="cs-CZ" dirty="0"/>
-              <a:t>Byla vytvořena univerzální knihovna řešící kopírování opakující se logiky v RPG hrách</a:t>
-            </a:r>
-          </a:p>
-          <a:p>
-            <a:r>
-              <a:rPr lang="cs-CZ" dirty="0"/>
-              <a:t>Knihovna by měla být bez problémů použitelná pro všechny RPG a hry se soubojovým systémem</a:t>
-            </a:r>
-          </a:p>
-          <a:p>
-            <a:endParaRPr lang="cs-CZ" dirty="0"/>
-          </a:p>
-          <a:p>
-            <a:endParaRPr lang="cs-CZ" dirty="0"/>
-          </a:p>
-          <a:p>
-            <a:pPr marL="114300" indent="0">
-              <a:buNone/>
-            </a:pPr>
             <a:endParaRPr lang="cs-CZ" dirty="0"/>
           </a:p>
         </p:txBody>
@@ -15927,91 +15860,6 @@
               <a:rPr lang="cs-CZ" smtClean="0"/>
               <a:pPr/>
               <a:t>10</a:t>
-            </a:fld>
-            <a:endParaRPr lang="cs-CZ"/>
-          </a:p>
-        </p:txBody>
-      </p:sp>
-    </p:spTree>
-    <p:extLst>
-      <p:ext uri="{BB962C8B-B14F-4D97-AF65-F5344CB8AC3E}">
-        <p14:creationId xmlns:p14="http://schemas.microsoft.com/office/powerpoint/2010/main" val="3462570208"/>
-      </p:ext>
-    </p:extLst>
-  </p:cSld>
-  <p:clrMapOvr>
-    <a:masterClrMapping/>
-  </p:clrMapOvr>
-</p:sld>
-</file>
-
-<file path=ppt/slides/slide11.xml><?xml version="1.0" encoding="utf-8"?>
-<p:sld xmlns:a="http://schemas.openxmlformats.org/drawingml/2006/main" xmlns:r="http://schemas.openxmlformats.org/officeDocument/2006/relationships" xmlns:p="http://schemas.openxmlformats.org/presentationml/2006/main">
-  <p:cSld>
-    <p:spTree>
-      <p:nvGrpSpPr>
-        <p:cNvPr id="1" name=""/>
-        <p:cNvGrpSpPr/>
-        <p:nvPr/>
-      </p:nvGrpSpPr>
-      <p:grpSpPr>
-        <a:xfrm>
-          <a:off x="0" y="0"/>
-          <a:ext cx="0" cy="0"/>
-          <a:chOff x="0" y="0"/>
-          <a:chExt cx="0" cy="0"/>
-        </a:xfrm>
-      </p:grpSpPr>
-      <p:sp>
-        <p:nvSpPr>
-          <p:cNvPr id="2" name="Nadpis 1">
-            <a:extLst>
-              <a:ext uri="{FF2B5EF4-FFF2-40B4-BE49-F238E27FC236}">
-                <a16:creationId xmlns:a16="http://schemas.microsoft.com/office/drawing/2014/main" id="{A56067FB-AABD-0F4C-89D0-D4BAE4F81F25}"/>
-              </a:ext>
-            </a:extLst>
-          </p:cNvPr>
-          <p:cNvSpPr>
-            <a:spLocks noGrp="1"/>
-          </p:cNvSpPr>
-          <p:nvPr>
-            <p:ph type="title"/>
-          </p:nvPr>
-        </p:nvSpPr>
-        <p:spPr/>
-        <p:txBody>
-          <a:bodyPr/>
-          <a:lstStyle/>
-          <a:p>
-            <a:endParaRPr lang="cs-CZ" dirty="0"/>
-          </a:p>
-        </p:txBody>
-      </p:sp>
-      <p:sp>
-        <p:nvSpPr>
-          <p:cNvPr id="4" name="Zástupný symbol pro číslo snímku 3">
-            <a:extLst>
-              <a:ext uri="{FF2B5EF4-FFF2-40B4-BE49-F238E27FC236}">
-                <a16:creationId xmlns:a16="http://schemas.microsoft.com/office/drawing/2014/main" id="{1F9131DD-D9B3-D7CF-7944-38A8AC9A76FB}"/>
-              </a:ext>
-            </a:extLst>
-          </p:cNvPr>
-          <p:cNvSpPr>
-            <a:spLocks noGrp="1"/>
-          </p:cNvSpPr>
-          <p:nvPr>
-            <p:ph type="sldNum" idx="12"/>
-          </p:nvPr>
-        </p:nvSpPr>
-        <p:spPr/>
-        <p:txBody>
-          <a:bodyPr/>
-          <a:lstStyle/>
-          <a:p>
-            <a:fld id="{00000000-1234-1234-1234-123412341234}" type="slidenum">
-              <a:rPr lang="cs-CZ" smtClean="0"/>
-              <a:pPr/>
-              <a:t>11</a:t>
             </a:fld>
             <a:endParaRPr lang="cs-CZ"/>
           </a:p>
@@ -16065,7 +15913,7 @@
 </p:sld>
 </file>
 
-<file path=ppt/slides/slide12.xml><?xml version="1.0" encoding="utf-8"?>
+<file path=ppt/slides/slide11.xml><?xml version="1.0" encoding="utf-8"?>
 <p:sld xmlns:a="http://schemas.openxmlformats.org/drawingml/2006/main" xmlns:r="http://schemas.openxmlformats.org/officeDocument/2006/relationships" xmlns:p="http://schemas.openxmlformats.org/presentationml/2006/main">
   <p:cSld>
     <p:spTree>
@@ -16182,7 +16030,7 @@
             <a:fld id="{00000000-1234-1234-1234-123412341234}" type="slidenum">
               <a:rPr lang="cs-CZ" smtClean="0"/>
               <a:pPr/>
-              <a:t>12</a:t>
+              <a:t>11</a:t>
             </a:fld>
             <a:endParaRPr lang="cs-CZ"/>
           </a:p>
@@ -16201,7 +16049,7 @@
 </p:sld>
 </file>
 
-<file path=ppt/slides/slide13.xml><?xml version="1.0" encoding="utf-8"?>
+<file path=ppt/slides/slide12.xml><?xml version="1.0" encoding="utf-8"?>
 <p:sld xmlns:a="http://schemas.openxmlformats.org/drawingml/2006/main" xmlns:r="http://schemas.openxmlformats.org/officeDocument/2006/relationships" xmlns:p="http://schemas.openxmlformats.org/presentationml/2006/main">
   <p:cSld>
     <p:spTree>
@@ -16328,7 +16176,7 @@
             <a:fld id="{00000000-1234-1234-1234-123412341234}" type="slidenum">
               <a:rPr lang="cs-CZ" smtClean="0"/>
               <a:pPr/>
-              <a:t>13</a:t>
+              <a:t>12</a:t>
             </a:fld>
             <a:endParaRPr lang="cs-CZ"/>
           </a:p>
@@ -16670,7 +16518,7 @@
           <a:p>
             <a:r>
               <a:rPr lang="cs-CZ" dirty="0"/>
-              <a:t>porovnání uživatelských rozhraní pro .NET a herních </a:t>
+              <a:t>porovnání herních </a:t>
             </a:r>
             <a:r>
               <a:rPr lang="cs-CZ" dirty="0" err="1"/>
@@ -18657,558 +18505,6 @@
           <p:cNvPr id="2" name="Nadpis 1">
             <a:extLst>
               <a:ext uri="{FF2B5EF4-FFF2-40B4-BE49-F238E27FC236}">
-                <a16:creationId xmlns:a16="http://schemas.microsoft.com/office/drawing/2014/main" id="{E317F48B-E8C5-D652-8802-DA402D8F4C01}"/>
-              </a:ext>
-            </a:extLst>
-          </p:cNvPr>
-          <p:cNvSpPr>
-            <a:spLocks noGrp="1"/>
-          </p:cNvSpPr>
-          <p:nvPr>
-            <p:ph type="title"/>
-          </p:nvPr>
-        </p:nvSpPr>
-        <p:spPr/>
-        <p:txBody>
-          <a:bodyPr/>
-          <a:lstStyle/>
-          <a:p>
-            <a:r>
-              <a:rPr lang="cs-CZ" dirty="0"/>
-              <a:t>porovnání uživatelských rozhraní</a:t>
-            </a:r>
-          </a:p>
-        </p:txBody>
-      </p:sp>
-      <p:sp>
-        <p:nvSpPr>
-          <p:cNvPr id="4" name="Zástupný symbol pro číslo snímku 3">
-            <a:extLst>
-              <a:ext uri="{FF2B5EF4-FFF2-40B4-BE49-F238E27FC236}">
-                <a16:creationId xmlns:a16="http://schemas.microsoft.com/office/drawing/2014/main" id="{9698D0F5-5E84-CF07-3D4E-46E200ED4464}"/>
-              </a:ext>
-            </a:extLst>
-          </p:cNvPr>
-          <p:cNvSpPr>
-            <a:spLocks noGrp="1"/>
-          </p:cNvSpPr>
-          <p:nvPr>
-            <p:ph type="sldNum" idx="12"/>
-          </p:nvPr>
-        </p:nvSpPr>
-        <p:spPr/>
-        <p:txBody>
-          <a:bodyPr/>
-          <a:lstStyle/>
-          <a:p>
-            <a:fld id="{00000000-1234-1234-1234-123412341234}" type="slidenum">
-              <a:rPr lang="cs-CZ" smtClean="0"/>
-              <a:pPr/>
-              <a:t>6</a:t>
-            </a:fld>
-            <a:endParaRPr lang="cs-CZ"/>
-          </a:p>
-        </p:txBody>
-      </p:sp>
-      <p:graphicFrame>
-        <p:nvGraphicFramePr>
-          <p:cNvPr id="3" name="Tabulka 5">
-            <a:extLst>
-              <a:ext uri="{FF2B5EF4-FFF2-40B4-BE49-F238E27FC236}">
-                <a16:creationId xmlns:a16="http://schemas.microsoft.com/office/drawing/2014/main" id="{0155AB96-F904-BAA3-A871-F2B690534B24}"/>
-              </a:ext>
-            </a:extLst>
-          </p:cNvPr>
-          <p:cNvGraphicFramePr>
-            <a:graphicFrameLocks noGrp="1"/>
-          </p:cNvGraphicFramePr>
-          <p:nvPr>
-            <p:extLst>
-              <p:ext uri="{D42A27DB-BD31-4B8C-83A1-F6EECF244321}">
-                <p14:modId xmlns:p14="http://schemas.microsoft.com/office/powerpoint/2010/main" val="961001217"/>
-              </p:ext>
-            </p:extLst>
-          </p:nvPr>
-        </p:nvGraphicFramePr>
-        <p:xfrm>
-          <a:off x="327378" y="1556367"/>
-          <a:ext cx="11604979" cy="3951482"/>
-        </p:xfrm>
-        <a:graphic>
-          <a:graphicData uri="http://schemas.openxmlformats.org/drawingml/2006/table">
-            <a:tbl>
-              <a:tblPr firstRow="1" bandRow="1">
-                <a:tableStyleId>{5940675A-B579-460E-94D1-54222C63F5DA}</a:tableStyleId>
-              </a:tblPr>
-              <a:tblGrid>
-                <a:gridCol w="1580444">
-                  <a:extLst>
-                    <a:ext uri="{9D8B030D-6E8A-4147-A177-3AD203B41FA5}">
-                      <a16:colId xmlns:a16="http://schemas.microsoft.com/office/drawing/2014/main" val="118925391"/>
-                    </a:ext>
-                  </a:extLst>
-                </a:gridCol>
-                <a:gridCol w="3872089">
-                  <a:extLst>
-                    <a:ext uri="{9D8B030D-6E8A-4147-A177-3AD203B41FA5}">
-                      <a16:colId xmlns:a16="http://schemas.microsoft.com/office/drawing/2014/main" val="1808954872"/>
-                    </a:ext>
-                  </a:extLst>
-                </a:gridCol>
-                <a:gridCol w="3251201">
-                  <a:extLst>
-                    <a:ext uri="{9D8B030D-6E8A-4147-A177-3AD203B41FA5}">
-                      <a16:colId xmlns:a16="http://schemas.microsoft.com/office/drawing/2014/main" val="162510989"/>
-                    </a:ext>
-                  </a:extLst>
-                </a:gridCol>
-                <a:gridCol w="2901245">
-                  <a:extLst>
-                    <a:ext uri="{9D8B030D-6E8A-4147-A177-3AD203B41FA5}">
-                      <a16:colId xmlns:a16="http://schemas.microsoft.com/office/drawing/2014/main" val="3809194893"/>
-                    </a:ext>
-                  </a:extLst>
-                </a:gridCol>
-              </a:tblGrid>
-              <a:tr h="385322">
-                <a:tc>
-                  <a:txBody>
-                    <a:bodyPr/>
-                    <a:lstStyle/>
-                    <a:p>
-                      <a:endParaRPr lang="cs-CZ"/>
-                    </a:p>
-                  </a:txBody>
-                  <a:tcPr/>
-                </a:tc>
-                <a:tc>
-                  <a:txBody>
-                    <a:bodyPr/>
-                    <a:lstStyle/>
-                    <a:p>
-                      <a:r>
-                        <a:rPr lang="cs-CZ" b="1" dirty="0"/>
-                        <a:t>použití</a:t>
-                      </a:r>
-                    </a:p>
-                  </a:txBody>
-                  <a:tcPr/>
-                </a:tc>
-                <a:tc>
-                  <a:txBody>
-                    <a:bodyPr/>
-                    <a:lstStyle/>
-                    <a:p>
-                      <a:r>
-                        <a:rPr lang="cs-CZ" b="1" dirty="0"/>
-                        <a:t>výhody</a:t>
-                      </a:r>
-                    </a:p>
-                  </a:txBody>
-                  <a:tcPr/>
-                </a:tc>
-                <a:tc>
-                  <a:txBody>
-                    <a:bodyPr/>
-                    <a:lstStyle/>
-                    <a:p>
-                      <a:r>
-                        <a:rPr lang="cs-CZ" b="1" dirty="0"/>
-                        <a:t>nevýhody</a:t>
-                      </a:r>
-                    </a:p>
-                  </a:txBody>
-                  <a:tcPr/>
-                </a:tc>
-                <a:extLst>
-                  <a:ext uri="{0D108BD9-81ED-4DB2-BD59-A6C34878D82A}">
-                    <a16:rowId xmlns:a16="http://schemas.microsoft.com/office/drawing/2014/main" val="4036211627"/>
-                  </a:ext>
-                </a:extLst>
-              </a:tr>
-              <a:tr h="370840">
-                <a:tc>
-                  <a:txBody>
-                    <a:bodyPr/>
-                    <a:lstStyle/>
-                    <a:p>
-                      <a:r>
-                        <a:rPr lang="cs-CZ" b="1" dirty="0"/>
-                        <a:t>Konzole</a:t>
-                      </a:r>
-                    </a:p>
-                  </a:txBody>
-                  <a:tcPr/>
-                </a:tc>
-                <a:tc>
-                  <a:txBody>
-                    <a:bodyPr/>
-                    <a:lstStyle/>
-                    <a:p>
-                      <a:r>
-                        <a:rPr lang="cs-CZ" dirty="0"/>
-                        <a:t>automatizace</a:t>
-                      </a:r>
-                    </a:p>
-                  </a:txBody>
-                  <a:tcPr/>
-                </a:tc>
-                <a:tc>
-                  <a:txBody>
-                    <a:bodyPr/>
-                    <a:lstStyle/>
-                    <a:p>
-                      <a:r>
-                        <a:rPr lang="cs-CZ" dirty="0"/>
-                        <a:t>Rychlé a jednoduché</a:t>
-                      </a:r>
-                    </a:p>
-                    <a:p>
-                      <a:r>
-                        <a:rPr lang="cs-CZ" dirty="0"/>
-                        <a:t>Stabilní</a:t>
-                      </a:r>
-                    </a:p>
-                    <a:p>
-                      <a:r>
-                        <a:rPr lang="cs-CZ" dirty="0"/>
-                        <a:t>Vhodné pro testování</a:t>
-                      </a:r>
-                    </a:p>
-                    <a:p>
-                      <a:r>
-                        <a:rPr lang="cs-CZ" dirty="0" err="1"/>
-                        <a:t>Cross-platform</a:t>
-                      </a:r>
-                      <a:endParaRPr lang="cs-CZ" dirty="0"/>
-                    </a:p>
-                  </a:txBody>
-                  <a:tcPr/>
-                </a:tc>
-                <a:tc>
-                  <a:txBody>
-                    <a:bodyPr/>
-                    <a:lstStyle/>
-                    <a:p>
-                      <a:r>
-                        <a:rPr lang="cs-CZ" dirty="0"/>
-                        <a:t>Nevhodné pro běžného uživatele</a:t>
-                      </a:r>
-                    </a:p>
-                  </a:txBody>
-                  <a:tcPr/>
-                </a:tc>
-                <a:extLst>
-                  <a:ext uri="{0D108BD9-81ED-4DB2-BD59-A6C34878D82A}">
-                    <a16:rowId xmlns:a16="http://schemas.microsoft.com/office/drawing/2014/main" val="274455474"/>
-                  </a:ext>
-                </a:extLst>
-              </a:tr>
-              <a:tr h="370840">
-                <a:tc>
-                  <a:txBody>
-                    <a:bodyPr/>
-                    <a:lstStyle/>
-                    <a:p>
-                      <a:r>
-                        <a:rPr lang="cs-CZ" b="1" dirty="0"/>
-                        <a:t>WinForm</a:t>
-                      </a:r>
-                    </a:p>
-                  </a:txBody>
-                  <a:tcPr/>
-                </a:tc>
-                <a:tc>
-                  <a:txBody>
-                    <a:bodyPr/>
-                    <a:lstStyle/>
-                    <a:p>
-                      <a:r>
-                        <a:rPr lang="cs-CZ" dirty="0"/>
-                        <a:t>Jednoduché UI</a:t>
-                      </a:r>
-                    </a:p>
-                    <a:p>
-                      <a:r>
-                        <a:rPr lang="cs-CZ" dirty="0"/>
-                        <a:t>Rychlý vývoj</a:t>
-                      </a:r>
-                    </a:p>
-                  </a:txBody>
-                  <a:tcPr/>
-                </a:tc>
-                <a:tc>
-                  <a:txBody>
-                    <a:bodyPr/>
-                    <a:lstStyle/>
-                    <a:p>
-                      <a:r>
-                        <a:rPr lang="cs-CZ" dirty="0"/>
-                        <a:t>Rychlé a jednoduché</a:t>
-                      </a:r>
-                    </a:p>
-                    <a:p>
-                      <a:r>
-                        <a:rPr lang="cs-CZ" dirty="0"/>
-                        <a:t>Hodně používané</a:t>
-                      </a:r>
-                    </a:p>
-                    <a:p>
-                      <a:r>
-                        <a:rPr lang="cs-CZ" dirty="0"/>
-                        <a:t>Spolehlivé</a:t>
-                      </a:r>
-                    </a:p>
-                    <a:p>
-                      <a:r>
-                        <a:rPr lang="cs-CZ" dirty="0"/>
-                        <a:t>Použitelné při vzdálené ploše</a:t>
-                      </a:r>
-                    </a:p>
-                  </a:txBody>
-                  <a:tcPr/>
-                </a:tc>
-                <a:tc>
-                  <a:txBody>
-                    <a:bodyPr/>
-                    <a:lstStyle/>
-                    <a:p>
-                      <a:r>
-                        <a:rPr lang="cs-CZ" dirty="0"/>
-                        <a:t>Veškerou práci dělá CPU</a:t>
-                      </a:r>
-                    </a:p>
-                    <a:p>
-                      <a:r>
-                        <a:rPr lang="cs-CZ" dirty="0"/>
-                        <a:t>Obtížná změna velikosti</a:t>
-                      </a:r>
-                    </a:p>
-                  </a:txBody>
-                  <a:tcPr/>
-                </a:tc>
-                <a:extLst>
-                  <a:ext uri="{0D108BD9-81ED-4DB2-BD59-A6C34878D82A}">
-                    <a16:rowId xmlns:a16="http://schemas.microsoft.com/office/drawing/2014/main" val="3953841490"/>
-                  </a:ext>
-                </a:extLst>
-              </a:tr>
-              <a:tr h="370840">
-                <a:tc>
-                  <a:txBody>
-                    <a:bodyPr/>
-                    <a:lstStyle/>
-                    <a:p>
-                      <a:r>
-                        <a:rPr lang="cs-CZ" b="1" dirty="0"/>
-                        <a:t>WPF</a:t>
-                      </a:r>
-                    </a:p>
-                  </a:txBody>
-                  <a:tcPr/>
-                </a:tc>
-                <a:tc>
-                  <a:txBody>
-                    <a:bodyPr/>
-                    <a:lstStyle/>
-                    <a:p>
-                      <a:r>
-                        <a:rPr lang="cs-CZ" dirty="0"/>
-                        <a:t>Výkonné UI</a:t>
-                      </a:r>
-                    </a:p>
-                  </a:txBody>
-                  <a:tcPr/>
-                </a:tc>
-                <a:tc>
-                  <a:txBody>
-                    <a:bodyPr/>
-                    <a:lstStyle/>
-                    <a:p>
-                      <a:r>
-                        <a:rPr lang="cs-CZ" dirty="0"/>
-                        <a:t>DirectX</a:t>
-                      </a:r>
-                    </a:p>
-                    <a:p>
-                      <a:r>
-                        <a:rPr lang="cs-CZ" dirty="0"/>
-                        <a:t>Moderní design</a:t>
-                      </a:r>
-                    </a:p>
-                    <a:p>
-                      <a:r>
-                        <a:rPr lang="cs-CZ" dirty="0"/>
-                        <a:t>MVVM </a:t>
-                      </a:r>
-                      <a:r>
-                        <a:rPr lang="cs-CZ" dirty="0" err="1"/>
-                        <a:t>pattern</a:t>
-                      </a:r>
-                      <a:endParaRPr lang="cs-CZ" dirty="0"/>
-                    </a:p>
-                    <a:p>
-                      <a:r>
-                        <a:rPr lang="cs-CZ" dirty="0"/>
-                        <a:t>Designer nemusí umět programovat</a:t>
-                      </a:r>
-                    </a:p>
-                  </a:txBody>
-                  <a:tcPr/>
-                </a:tc>
-                <a:tc>
-                  <a:txBody>
-                    <a:bodyPr/>
-                    <a:lstStyle/>
-                    <a:p>
-                      <a:r>
-                        <a:rPr lang="cs-CZ" dirty="0"/>
-                        <a:t>Pomalý vývoj</a:t>
-                      </a:r>
-                    </a:p>
-                    <a:p>
-                      <a:r>
-                        <a:rPr lang="cs-CZ" dirty="0"/>
-                        <a:t>XAML</a:t>
-                      </a:r>
-                    </a:p>
-                  </a:txBody>
-                  <a:tcPr/>
-                </a:tc>
-                <a:extLst>
-                  <a:ext uri="{0D108BD9-81ED-4DB2-BD59-A6C34878D82A}">
-                    <a16:rowId xmlns:a16="http://schemas.microsoft.com/office/drawing/2014/main" val="1882315354"/>
-                  </a:ext>
-                </a:extLst>
-              </a:tr>
-              <a:tr h="370840">
-                <a:tc>
-                  <a:txBody>
-                    <a:bodyPr/>
-                    <a:lstStyle/>
-                    <a:p>
-                      <a:r>
-                        <a:rPr lang="cs-CZ" b="1" dirty="0" err="1"/>
-                        <a:t>Xamarin</a:t>
-                      </a:r>
-                      <a:r>
-                        <a:rPr lang="cs-CZ" b="1" dirty="0"/>
-                        <a:t>/MAUI</a:t>
-                      </a:r>
-                    </a:p>
-                  </a:txBody>
-                  <a:tcPr/>
-                </a:tc>
-                <a:tc>
-                  <a:txBody>
-                    <a:bodyPr/>
-                    <a:lstStyle/>
-                    <a:p>
-                      <a:r>
-                        <a:rPr lang="cs-CZ" dirty="0"/>
-                        <a:t>Aplikace pro Windows10/11 a Xbox (UWP)</a:t>
-                      </a:r>
-                    </a:p>
-                    <a:p>
-                      <a:r>
-                        <a:rPr lang="cs-CZ" dirty="0"/>
-                        <a:t>Mobilní aplikace</a:t>
-                      </a:r>
-                    </a:p>
-                  </a:txBody>
-                  <a:tcPr/>
-                </a:tc>
-                <a:tc>
-                  <a:txBody>
-                    <a:bodyPr/>
-                    <a:lstStyle/>
-                    <a:p>
-                      <a:r>
-                        <a:rPr lang="cs-CZ" dirty="0" err="1"/>
-                        <a:t>Sandbox</a:t>
-                      </a:r>
-                      <a:endParaRPr lang="cs-CZ" dirty="0"/>
-                    </a:p>
-                    <a:p>
-                      <a:r>
-                        <a:rPr lang="cs-CZ" dirty="0"/>
-                        <a:t>Distribuce přes obchod</a:t>
-                      </a:r>
-                    </a:p>
-                  </a:txBody>
-                  <a:tcPr/>
-                </a:tc>
-                <a:tc>
-                  <a:txBody>
-                    <a:bodyPr/>
-                    <a:lstStyle/>
-                    <a:p>
-                      <a:r>
-                        <a:rPr lang="cs-CZ" dirty="0" err="1"/>
-                        <a:t>Sandbox</a:t>
-                      </a:r>
-                      <a:endParaRPr lang="cs-CZ" dirty="0"/>
-                    </a:p>
-                    <a:p>
-                      <a:r>
-                        <a:rPr lang="cs-CZ" dirty="0"/>
-                        <a:t>Nefunguje pro starší Windows</a:t>
-                      </a:r>
-                    </a:p>
-                    <a:p>
-                      <a:r>
-                        <a:rPr lang="cs-CZ" dirty="0"/>
-                        <a:t>Obtížná distribuce</a:t>
-                      </a:r>
-                    </a:p>
-                  </a:txBody>
-                  <a:tcPr/>
-                </a:tc>
-                <a:extLst>
-                  <a:ext uri="{0D108BD9-81ED-4DB2-BD59-A6C34878D82A}">
-                    <a16:rowId xmlns:a16="http://schemas.microsoft.com/office/drawing/2014/main" val="2889852098"/>
-                  </a:ext>
-                </a:extLst>
-              </a:tr>
-            </a:tbl>
-          </a:graphicData>
-        </a:graphic>
-      </p:graphicFrame>
-    </p:spTree>
-    <p:extLst>
-      <p:ext uri="{BB962C8B-B14F-4D97-AF65-F5344CB8AC3E}">
-        <p14:creationId xmlns:p14="http://schemas.microsoft.com/office/powerpoint/2010/main" val="1341809703"/>
-      </p:ext>
-    </p:extLst>
-  </p:cSld>
-  <p:clrMapOvr>
-    <a:masterClrMapping/>
-  </p:clrMapOvr>
-</p:sld>
-</file>
-
-<file path=ppt/slides/slide7.xml><?xml version="1.0" encoding="utf-8"?>
-<p:sld xmlns:a="http://schemas.openxmlformats.org/drawingml/2006/main" xmlns:r="http://schemas.openxmlformats.org/officeDocument/2006/relationships" xmlns:p="http://schemas.openxmlformats.org/presentationml/2006/main">
-  <p:cSld>
-    <p:spTree>
-      <p:nvGrpSpPr>
-        <p:cNvPr id="1" name=""/>
-        <p:cNvGrpSpPr/>
-        <p:nvPr/>
-      </p:nvGrpSpPr>
-      <p:grpSpPr>
-        <a:xfrm>
-          <a:off x="0" y="0"/>
-          <a:ext cx="0" cy="0"/>
-          <a:chOff x="0" y="0"/>
-          <a:chExt cx="0" cy="0"/>
-        </a:xfrm>
-      </p:grpSpPr>
-      <p:sp>
-        <p:nvSpPr>
-          <p:cNvPr id="2" name="Nadpis 1">
-            <a:extLst>
-              <a:ext uri="{FF2B5EF4-FFF2-40B4-BE49-F238E27FC236}">
                 <a16:creationId xmlns:a16="http://schemas.microsoft.com/office/drawing/2014/main" id="{2259867D-A200-22AC-790B-48B47B131FEB}"/>
               </a:ext>
             </a:extLst>
@@ -19261,7 +18557,7 @@
             <a:fld id="{00000000-1234-1234-1234-123412341234}" type="slidenum">
               <a:rPr lang="cs-CZ" smtClean="0"/>
               <a:pPr/>
-              <a:t>7</a:t>
+              <a:t>6</a:t>
             </a:fld>
             <a:endParaRPr lang="cs-CZ"/>
           </a:p>
@@ -21393,7 +20689,7 @@
 </p:sld>
 </file>
 
-<file path=ppt/slides/slide8.xml><?xml version="1.0" encoding="utf-8"?>
+<file path=ppt/slides/slide7.xml><?xml version="1.0" encoding="utf-8"?>
 <p:sld xmlns:a="http://schemas.openxmlformats.org/drawingml/2006/main" xmlns:r="http://schemas.openxmlformats.org/officeDocument/2006/relationships" xmlns:p="http://schemas.openxmlformats.org/presentationml/2006/main">
   <p:cSld>
     <p:spTree>
@@ -21462,7 +20758,7 @@
             <a:fld id="{00000000-1234-1234-1234-123412341234}" type="slidenum">
               <a:rPr lang="cs-CZ" smtClean="0"/>
               <a:pPr/>
-              <a:t>8</a:t>
+              <a:t>7</a:t>
             </a:fld>
             <a:endParaRPr lang="cs-CZ"/>
           </a:p>
@@ -21541,7 +20837,7 @@
 </p:sld>
 </file>
 
-<file path=ppt/slides/slide9.xml><?xml version="1.0" encoding="utf-8"?>
+<file path=ppt/slides/slide8.xml><?xml version="1.0" encoding="utf-8"?>
 <p:sld xmlns:a="http://schemas.openxmlformats.org/drawingml/2006/main" xmlns:r="http://schemas.openxmlformats.org/officeDocument/2006/relationships" xmlns:p="http://schemas.openxmlformats.org/presentationml/2006/main">
   <p:cSld>
     <p:spTree>
@@ -21610,7 +20906,7 @@
             <a:fld id="{00000000-1234-1234-1234-123412341234}" type="slidenum">
               <a:rPr lang="cs-CZ" smtClean="0"/>
               <a:pPr/>
-              <a:t>9</a:t>
+              <a:t>8</a:t>
             </a:fld>
             <a:endParaRPr lang="cs-CZ"/>
           </a:p>
@@ -22263,6 +21559,157 @@
 </p:sld>
 </file>
 
+<file path=ppt/slides/slide9.xml><?xml version="1.0" encoding="utf-8"?>
+<p:sld xmlns:a="http://schemas.openxmlformats.org/drawingml/2006/main" xmlns:r="http://schemas.openxmlformats.org/officeDocument/2006/relationships" xmlns:p="http://schemas.openxmlformats.org/presentationml/2006/main">
+  <p:cSld>
+    <p:spTree>
+      <p:nvGrpSpPr>
+        <p:cNvPr id="1" name=""/>
+        <p:cNvGrpSpPr/>
+        <p:nvPr/>
+      </p:nvGrpSpPr>
+      <p:grpSpPr>
+        <a:xfrm>
+          <a:off x="0" y="0"/>
+          <a:ext cx="0" cy="0"/>
+          <a:chOff x="0" y="0"/>
+          <a:chExt cx="0" cy="0"/>
+        </a:xfrm>
+      </p:grpSpPr>
+      <p:sp>
+        <p:nvSpPr>
+          <p:cNvPr id="2" name="Nadpis 1">
+            <a:extLst>
+              <a:ext uri="{FF2B5EF4-FFF2-40B4-BE49-F238E27FC236}">
+                <a16:creationId xmlns:a16="http://schemas.microsoft.com/office/drawing/2014/main" id="{A56067FB-AABD-0F4C-89D0-D4BAE4F81F25}"/>
+              </a:ext>
+            </a:extLst>
+          </p:cNvPr>
+          <p:cNvSpPr>
+            <a:spLocks noGrp="1"/>
+          </p:cNvSpPr>
+          <p:nvPr>
+            <p:ph type="title"/>
+          </p:nvPr>
+        </p:nvSpPr>
+        <p:spPr/>
+        <p:txBody>
+          <a:bodyPr/>
+          <a:lstStyle/>
+          <a:p>
+            <a:r>
+              <a:rPr lang="cs-CZ" dirty="0"/>
+              <a:t>Závěr</a:t>
+            </a:r>
+          </a:p>
+        </p:txBody>
+      </p:sp>
+      <p:sp>
+        <p:nvSpPr>
+          <p:cNvPr id="3" name="Zástupný text 2">
+            <a:extLst>
+              <a:ext uri="{FF2B5EF4-FFF2-40B4-BE49-F238E27FC236}">
+                <a16:creationId xmlns:a16="http://schemas.microsoft.com/office/drawing/2014/main" id="{7F11784E-AC65-AAC7-3A0A-A60E6EF0863A}"/>
+              </a:ext>
+            </a:extLst>
+          </p:cNvPr>
+          <p:cNvSpPr>
+            <a:spLocks noGrp="1"/>
+          </p:cNvSpPr>
+          <p:nvPr>
+            <p:ph type="body" idx="1"/>
+          </p:nvPr>
+        </p:nvSpPr>
+        <p:spPr/>
+        <p:txBody>
+          <a:bodyPr/>
+          <a:lstStyle/>
+          <a:p>
+            <a:r>
+              <a:rPr lang="cs-CZ" dirty="0"/>
+              <a:t>K realizaci byl zvolen C# protože podporuje dva ze tří největších herních </a:t>
+            </a:r>
+            <a:r>
+              <a:rPr lang="cs-CZ" dirty="0" err="1"/>
+              <a:t>enginů</a:t>
+            </a:r>
+            <a:endParaRPr lang="cs-CZ" dirty="0"/>
+          </a:p>
+          <a:p>
+            <a:r>
+              <a:rPr lang="cs-CZ" dirty="0"/>
+              <a:t>Výhodou C# oproti C++ je lepší čitelnost a kompatibilita s .NET</a:t>
+            </a:r>
+          </a:p>
+          <a:p>
+            <a:r>
+              <a:rPr lang="cs-CZ" dirty="0"/>
+              <a:t>Byla vytvořena univerzální knihovna řešící kopírování opakující se logiky v RPG hrách</a:t>
+            </a:r>
+          </a:p>
+          <a:p>
+            <a:r>
+              <a:rPr lang="cs-CZ" dirty="0"/>
+              <a:t>Knihovna by měla být bez problémů použitelná pro všechny RPG a hry se soubojovým systémem</a:t>
+            </a:r>
+          </a:p>
+          <a:p>
+            <a:endParaRPr lang="cs-CZ" dirty="0"/>
+          </a:p>
+          <a:p>
+            <a:endParaRPr lang="cs-CZ" dirty="0"/>
+          </a:p>
+          <a:p>
+            <a:pPr marL="114300" indent="0">
+              <a:buNone/>
+            </a:pPr>
+            <a:endParaRPr lang="cs-CZ" dirty="0"/>
+          </a:p>
+        </p:txBody>
+      </p:sp>
+      <p:sp>
+        <p:nvSpPr>
+          <p:cNvPr id="4" name="Zástupný symbol pro číslo snímku 3">
+            <a:extLst>
+              <a:ext uri="{FF2B5EF4-FFF2-40B4-BE49-F238E27FC236}">
+                <a16:creationId xmlns:a16="http://schemas.microsoft.com/office/drawing/2014/main" id="{1F9131DD-D9B3-D7CF-7944-38A8AC9A76FB}"/>
+              </a:ext>
+            </a:extLst>
+          </p:cNvPr>
+          <p:cNvSpPr>
+            <a:spLocks noGrp="1"/>
+          </p:cNvSpPr>
+          <p:nvPr>
+            <p:ph type="sldNum" idx="12"/>
+          </p:nvPr>
+        </p:nvSpPr>
+        <p:spPr/>
+        <p:txBody>
+          <a:bodyPr/>
+          <a:lstStyle/>
+          <a:p>
+            <a:fld id="{00000000-1234-1234-1234-123412341234}" type="slidenum">
+              <a:rPr lang="cs-CZ" smtClean="0"/>
+              <a:pPr/>
+              <a:t>9</a:t>
+            </a:fld>
+            <a:endParaRPr lang="cs-CZ"/>
+          </a:p>
+        </p:txBody>
+      </p:sp>
+    </p:spTree>
+    <p:extLst>
+      <p:ext uri="{BB962C8B-B14F-4D97-AF65-F5344CB8AC3E}">
+        <p14:creationId xmlns:p14="http://schemas.microsoft.com/office/powerpoint/2010/main" val="3462570208"/>
+      </p:ext>
+    </p:extLst>
+  </p:cSld>
+  <p:clrMapOvr>
+    <a:masterClrMapping/>
+  </p:clrMapOvr>
+</p:sld>
+</file>
+
 <file path=ppt/theme/theme1.xml><?xml version="1.0" encoding="utf-8"?>
 <a:theme xmlns:a="http://schemas.openxmlformats.org/drawingml/2006/main" name="Motiv Office">
   <a:themeElements>

</xml_diff>